<commit_message>
data importing going well, hit a snag at diet plans
</commit_message>
<xml_diff>
--- a/ProjectDocumentaion/TableDesigns.pptx
+++ b/ProjectDocumentaion/TableDesigns.pptx
@@ -75,7 +75,7 @@
         <p:txBody>
           <a:bodyPr/>
           <a:p>
-            <a:fld id="{81C569BB-E9DE-4B96-AB3F-0C7FC856ADAD}" type="slidenum">
+            <a:fld id="{C5A40572-0088-499D-9367-4F391ABA7678}" type="slidenum">
               <a:t>&lt;#&gt;</a:t>
             </a:fld>
           </a:p>
@@ -263,7 +263,7 @@
         <p:txBody>
           <a:bodyPr/>
           <a:p>
-            <a:fld id="{E89B45B8-B410-4479-8593-FAC83FAF707D}" type="slidenum">
+            <a:fld id="{7B9E3C10-EA2C-444B-9E10-779C6ACBDDC7}" type="slidenum">
               <a:t>&lt;#&gt;</a:t>
             </a:fld>
           </a:p>
@@ -519,7 +519,7 @@
         <p:txBody>
           <a:bodyPr/>
           <a:p>
-            <a:fld id="{C2152EB1-DCCA-4D27-AA28-3ED683DBD1EB}" type="slidenum">
+            <a:fld id="{62073B43-D7F4-45E2-B31C-658D79F83252}" type="slidenum">
               <a:t>&lt;#&gt;</a:t>
             </a:fld>
           </a:p>
@@ -843,7 +843,7 @@
         <p:txBody>
           <a:bodyPr/>
           <a:p>
-            <a:fld id="{934E1DFC-FAE1-48C5-8979-01C018CC64CB}" type="slidenum">
+            <a:fld id="{3EC464B2-3AFF-4A60-AB83-B5E22444974F}" type="slidenum">
               <a:t>&lt;#&gt;</a:t>
             </a:fld>
           </a:p>
@@ -926,7 +926,7 @@
         <p:txBody>
           <a:bodyPr/>
           <a:p>
-            <a:fld id="{FDA78F28-59D6-4FD8-8387-C51D2E1B3414}" type="slidenum">
+            <a:fld id="{857FC480-028D-4286-8B19-5C222EFE4677}" type="slidenum">
               <a:t>&lt;#&gt;</a:t>
             </a:fld>
           </a:p>
@@ -1083,7 +1083,7 @@
         <p:txBody>
           <a:bodyPr/>
           <a:p>
-            <a:fld id="{A28F7A8B-781B-4308-AC96-4035339464C3}" type="slidenum">
+            <a:fld id="{8772B7B2-0BDF-49F4-A393-EEC8CDE93848}" type="slidenum">
               <a:t>&lt;#&gt;</a:t>
             </a:fld>
           </a:p>
@@ -1237,7 +1237,7 @@
         <p:txBody>
           <a:bodyPr/>
           <a:p>
-            <a:fld id="{8436D969-BC66-4963-8C34-B30556775FF8}" type="slidenum">
+            <a:fld id="{8EC230C0-C191-4EC7-963B-3FB98C090B2A}" type="slidenum">
               <a:t>&lt;#&gt;</a:t>
             </a:fld>
           </a:p>
@@ -1425,7 +1425,7 @@
         <p:txBody>
           <a:bodyPr/>
           <a:p>
-            <a:fld id="{6B924B3E-3CA0-4387-B92B-76CF3AA5DF14}" type="slidenum">
+            <a:fld id="{4065507A-B442-4A50-AFB6-403E60C173D3}" type="slidenum">
               <a:t>&lt;#&gt;</a:t>
             </a:fld>
           </a:p>
@@ -1545,7 +1545,7 @@
         <p:txBody>
           <a:bodyPr/>
           <a:p>
-            <a:fld id="{364058C3-C970-44E8-8D33-DFE602373872}" type="slidenum">
+            <a:fld id="{6339D922-A378-43B3-8DC9-144BBD0873C4}" type="slidenum">
               <a:t>&lt;#&gt;</a:t>
             </a:fld>
           </a:p>
@@ -1665,7 +1665,7 @@
         <p:txBody>
           <a:bodyPr/>
           <a:p>
-            <a:fld id="{67A14166-DDFD-43CD-9534-8F330ED769A4}" type="slidenum">
+            <a:fld id="{37C8D908-F7F6-4AD0-8041-7F27400BD683}" type="slidenum">
               <a:t>&lt;#&gt;</a:t>
             </a:fld>
           </a:p>
@@ -1887,7 +1887,7 @@
         <p:txBody>
           <a:bodyPr/>
           <a:p>
-            <a:fld id="{D6489AFE-1C67-493B-A351-60C7BB3643CE}" type="slidenum">
+            <a:fld id="{55A20932-5957-44A8-BBF0-9FB65E601A88}" type="slidenum">
               <a:t>&lt;#&gt;</a:t>
             </a:fld>
           </a:p>
@@ -2044,7 +2044,7 @@
         <p:txBody>
           <a:bodyPr/>
           <a:p>
-            <a:fld id="{3B26466A-0A32-4A46-B1A7-9F850272C76C}" type="slidenum">
+            <a:fld id="{9D46664C-ABF5-4DF3-8B05-45E5339CB283}" type="slidenum">
               <a:t>&lt;#&gt;</a:t>
             </a:fld>
           </a:p>
@@ -2266,7 +2266,7 @@
         <p:txBody>
           <a:bodyPr/>
           <a:p>
-            <a:fld id="{B2341E9A-A44E-4FDC-BC91-D8217A3F213D}" type="slidenum">
+            <a:fld id="{5A2DAE01-473A-459E-A3BD-020D666AD5BB}" type="slidenum">
               <a:t>&lt;#&gt;</a:t>
             </a:fld>
           </a:p>
@@ -2488,7 +2488,7 @@
         <p:txBody>
           <a:bodyPr/>
           <a:p>
-            <a:fld id="{F8173F8B-5AE7-4ED6-99EF-DF09B7B866E2}" type="slidenum">
+            <a:fld id="{E6C5D11C-3177-4368-A566-3AD572F2228B}" type="slidenum">
               <a:t>&lt;#&gt;</a:t>
             </a:fld>
           </a:p>
@@ -2676,7 +2676,7 @@
         <p:txBody>
           <a:bodyPr/>
           <a:p>
-            <a:fld id="{55397295-517B-490D-A87A-92DC0C9CE6D8}" type="slidenum">
+            <a:fld id="{5791D792-D654-4BBE-9683-CD728EB657EA}" type="slidenum">
               <a:t>&lt;#&gt;</a:t>
             </a:fld>
           </a:p>
@@ -2932,7 +2932,7 @@
         <p:txBody>
           <a:bodyPr/>
           <a:p>
-            <a:fld id="{3B66E7CF-B86F-44D9-A9EE-A1293A948A40}" type="slidenum">
+            <a:fld id="{01E53EEF-626D-4E0E-9F7E-877398B53028}" type="slidenum">
               <a:t>&lt;#&gt;</a:t>
             </a:fld>
           </a:p>
@@ -3256,7 +3256,7 @@
         <p:txBody>
           <a:bodyPr/>
           <a:p>
-            <a:fld id="{E14320FC-4EB2-4D91-8BC0-28CCFAA5EB82}" type="slidenum">
+            <a:fld id="{88A0D36F-ADEF-4959-9FC3-87D4D07C67AC}" type="slidenum">
               <a:t>&lt;#&gt;</a:t>
             </a:fld>
           </a:p>
@@ -3410,7 +3410,7 @@
         <p:txBody>
           <a:bodyPr/>
           <a:p>
-            <a:fld id="{934448A9-A9A7-441C-A7C5-F99673702B40}" type="slidenum">
+            <a:fld id="{401550D2-361A-4BD2-B4FC-46A07016FA8B}" type="slidenum">
               <a:t>&lt;#&gt;</a:t>
             </a:fld>
           </a:p>
@@ -3598,7 +3598,7 @@
         <p:txBody>
           <a:bodyPr/>
           <a:p>
-            <a:fld id="{2720E2D2-3A2D-49B3-9133-C21FA57F1AA9}" type="slidenum">
+            <a:fld id="{268FE4B7-303E-4AC4-BA0A-03B4EF0B3A56}" type="slidenum">
               <a:t>&lt;#&gt;</a:t>
             </a:fld>
           </a:p>
@@ -3718,7 +3718,7 @@
         <p:txBody>
           <a:bodyPr/>
           <a:p>
-            <a:fld id="{19E3D0A0-D770-4D28-85C8-7213032CA80A}" type="slidenum">
+            <a:fld id="{B839F315-8608-487D-AA9D-CA6208E86D57}" type="slidenum">
               <a:t>&lt;#&gt;</a:t>
             </a:fld>
           </a:p>
@@ -3838,7 +3838,7 @@
         <p:txBody>
           <a:bodyPr/>
           <a:p>
-            <a:fld id="{103D1A08-7482-4EB3-AB4C-41F250A29418}" type="slidenum">
+            <a:fld id="{904D9028-CCB6-43C5-B8FF-50461591FD7E}" type="slidenum">
               <a:t>&lt;#&gt;</a:t>
             </a:fld>
           </a:p>
@@ -4060,7 +4060,7 @@
         <p:txBody>
           <a:bodyPr/>
           <a:p>
-            <a:fld id="{C8C168A3-7E2F-4F02-B04F-8AD382FB65B0}" type="slidenum">
+            <a:fld id="{6FA2778B-7B13-4D39-AEB5-FF3F2CC112F6}" type="slidenum">
               <a:t>&lt;#&gt;</a:t>
             </a:fld>
           </a:p>
@@ -4282,7 +4282,7 @@
         <p:txBody>
           <a:bodyPr/>
           <a:p>
-            <a:fld id="{CEB4D73F-29D1-43A3-BF3F-B41036BFAD79}" type="slidenum">
+            <a:fld id="{AEC30A81-C71B-415C-8D15-3C6C7276892F}" type="slidenum">
               <a:t>&lt;#&gt;</a:t>
             </a:fld>
           </a:p>
@@ -4504,7 +4504,7 @@
         <p:txBody>
           <a:bodyPr/>
           <a:p>
-            <a:fld id="{95C6DB93-C6A6-4D69-8728-13B33EAE9120}" type="slidenum">
+            <a:fld id="{24A47D38-8081-4358-8928-AEE62C7E461D}" type="slidenum">
               <a:t>&lt;#&gt;</a:t>
             </a:fld>
           </a:p>
@@ -4572,8 +4572,8 @@
         </p:nvSpPr>
         <p:spPr>
           <a:xfrm>
-            <a:off x="838080" y="365040"/>
-            <a:ext cx="10514880" cy="1324800"/>
+            <a:off x="609480" y="273600"/>
+            <a:ext cx="10972080" cy="1144440"/>
           </a:xfrm>
           <a:prstGeom prst="rect">
             <a:avLst/>
@@ -4607,13 +4607,196 @@
             <a:spLocks noGrp="1"/>
           </p:cNvSpPr>
           <p:nvPr>
+            <p:ph type="body"/>
+          </p:nvPr>
+        </p:nvSpPr>
+        <p:spPr>
+          <a:xfrm>
+            <a:off x="609480" y="1604520"/>
+            <a:ext cx="10972080" cy="3976920"/>
+          </a:xfrm>
+          <a:prstGeom prst="rect">
+            <a:avLst/>
+          </a:prstGeom>
+          <a:noFill/>
+          <a:ln w="0">
+            <a:noFill/>
+          </a:ln>
+        </p:spPr>
+        <p:txBody>
+          <a:bodyPr lIns="0" rIns="0" tIns="0" bIns="0" anchor="t">
+            <a:normAutofit/>
+          </a:bodyPr>
+          <a:p>
+            <a:pPr marL="432000" indent="-324000">
+              <a:spcBef>
+                <a:spcPts val="1417"/>
+              </a:spcBef>
+              <a:buClr>
+                <a:srgbClr val="000000"/>
+              </a:buClr>
+              <a:buSzPct val="45000"/>
+              <a:buFont typeface="Wingdings" charset="2"/>
+              <a:buChar char=""/>
+            </a:pPr>
+            <a:r>
+              <a:rPr b="0" lang="en-IL" sz="1800" spc="-1" strike="noStrike">
+                <a:latin typeface="Arial"/>
+              </a:rPr>
+              <a:t>Click to edit the outline text format</a:t>
+            </a:r>
+            <a:endParaRPr b="0" lang="en-IL" sz="1800" spc="-1" strike="noStrike">
+              <a:latin typeface="Arial"/>
+            </a:endParaRPr>
+          </a:p>
+          <a:p>
+            <a:pPr lvl="1" marL="864000" indent="-324000">
+              <a:spcBef>
+                <a:spcPts val="1134"/>
+              </a:spcBef>
+              <a:buClr>
+                <a:srgbClr val="000000"/>
+              </a:buClr>
+              <a:buSzPct val="75000"/>
+              <a:buFont typeface="Symbol" charset="2"/>
+              <a:buChar char=""/>
+            </a:pPr>
+            <a:r>
+              <a:rPr b="0" lang="en-IL" sz="1800" spc="-1" strike="noStrike">
+                <a:latin typeface="Arial"/>
+              </a:rPr>
+              <a:t>Second Outline Level</a:t>
+            </a:r>
+            <a:endParaRPr b="0" lang="en-IL" sz="1800" spc="-1" strike="noStrike">
+              <a:latin typeface="Arial"/>
+            </a:endParaRPr>
+          </a:p>
+          <a:p>
+            <a:pPr lvl="2" marL="1296000" indent="-288000">
+              <a:spcBef>
+                <a:spcPts val="850"/>
+              </a:spcBef>
+              <a:buClr>
+                <a:srgbClr val="000000"/>
+              </a:buClr>
+              <a:buSzPct val="45000"/>
+              <a:buFont typeface="Wingdings" charset="2"/>
+              <a:buChar char=""/>
+            </a:pPr>
+            <a:r>
+              <a:rPr b="0" lang="en-IL" sz="1800" spc="-1" strike="noStrike">
+                <a:latin typeface="Arial"/>
+              </a:rPr>
+              <a:t>Third Outline Level</a:t>
+            </a:r>
+            <a:endParaRPr b="0" lang="en-IL" sz="1800" spc="-1" strike="noStrike">
+              <a:latin typeface="Arial"/>
+            </a:endParaRPr>
+          </a:p>
+          <a:p>
+            <a:pPr lvl="3" marL="1728000" indent="-216000">
+              <a:spcBef>
+                <a:spcPts val="567"/>
+              </a:spcBef>
+              <a:buClr>
+                <a:srgbClr val="000000"/>
+              </a:buClr>
+              <a:buSzPct val="75000"/>
+              <a:buFont typeface="Symbol" charset="2"/>
+              <a:buChar char=""/>
+            </a:pPr>
+            <a:r>
+              <a:rPr b="0" lang="en-IL" sz="1800" spc="-1" strike="noStrike">
+                <a:latin typeface="Arial"/>
+              </a:rPr>
+              <a:t>Fourth Outline Level</a:t>
+            </a:r>
+            <a:endParaRPr b="0" lang="en-IL" sz="1800" spc="-1" strike="noStrike">
+              <a:latin typeface="Arial"/>
+            </a:endParaRPr>
+          </a:p>
+          <a:p>
+            <a:pPr lvl="4" marL="2160000" indent="-216000">
+              <a:spcBef>
+                <a:spcPts val="283"/>
+              </a:spcBef>
+              <a:buClr>
+                <a:srgbClr val="000000"/>
+              </a:buClr>
+              <a:buSzPct val="45000"/>
+              <a:buFont typeface="Wingdings" charset="2"/>
+              <a:buChar char=""/>
+            </a:pPr>
+            <a:r>
+              <a:rPr b="0" lang="en-IL" sz="1800" spc="-1" strike="noStrike">
+                <a:latin typeface="Arial"/>
+              </a:rPr>
+              <a:t>Fifth Outline Level</a:t>
+            </a:r>
+            <a:endParaRPr b="0" lang="en-IL" sz="1800" spc="-1" strike="noStrike">
+              <a:latin typeface="Arial"/>
+            </a:endParaRPr>
+          </a:p>
+          <a:p>
+            <a:pPr lvl="5" marL="2592000" indent="-216000">
+              <a:spcBef>
+                <a:spcPts val="283"/>
+              </a:spcBef>
+              <a:buClr>
+                <a:srgbClr val="000000"/>
+              </a:buClr>
+              <a:buSzPct val="45000"/>
+              <a:buFont typeface="Wingdings" charset="2"/>
+              <a:buChar char=""/>
+            </a:pPr>
+            <a:r>
+              <a:rPr b="0" lang="en-IL" sz="1800" spc="-1" strike="noStrike">
+                <a:latin typeface="Arial"/>
+              </a:rPr>
+              <a:t>Sixth Outline Level</a:t>
+            </a:r>
+            <a:endParaRPr b="0" lang="en-IL" sz="1800" spc="-1" strike="noStrike">
+              <a:latin typeface="Arial"/>
+            </a:endParaRPr>
+          </a:p>
+          <a:p>
+            <a:pPr lvl="6" marL="3024000" indent="-216000">
+              <a:spcBef>
+                <a:spcPts val="283"/>
+              </a:spcBef>
+              <a:buClr>
+                <a:srgbClr val="000000"/>
+              </a:buClr>
+              <a:buSzPct val="45000"/>
+              <a:buFont typeface="Wingdings" charset="2"/>
+              <a:buChar char=""/>
+            </a:pPr>
+            <a:r>
+              <a:rPr b="0" lang="en-IL" sz="1800" spc="-1" strike="noStrike">
+                <a:latin typeface="Arial"/>
+              </a:rPr>
+              <a:t>Seventh Outline Level</a:t>
+            </a:r>
+            <a:endParaRPr b="0" lang="en-IL" sz="1800" spc="-1" strike="noStrike">
+              <a:latin typeface="Arial"/>
+            </a:endParaRPr>
+          </a:p>
+        </p:txBody>
+      </p:sp>
+      <p:sp>
+        <p:nvSpPr>
+          <p:cNvPr id="2" name="PlaceHolder 3"/>
+          <p:cNvSpPr>
+            <a:spLocks noGrp="1"/>
+          </p:cNvSpPr>
+          <p:nvPr>
             <p:ph type="ftr" idx="1"/>
           </p:nvPr>
         </p:nvSpPr>
         <p:spPr>
           <a:xfrm>
             <a:off x="4038480" y="6356520"/>
-            <a:ext cx="4114080" cy="364320"/>
+            <a:ext cx="4113720" cy="363960"/>
           </a:xfrm>
           <a:prstGeom prst="rect">
             <a:avLst/>
@@ -4659,7 +4842,7 @@
       </p:sp>
       <p:sp>
         <p:nvSpPr>
-          <p:cNvPr id="2" name="PlaceHolder 3"/>
+          <p:cNvPr id="3" name="PlaceHolder 4"/>
           <p:cNvSpPr>
             <a:spLocks noGrp="1"/>
           </p:cNvSpPr>
@@ -4670,7 +4853,7 @@
         <p:spPr>
           <a:xfrm>
             <a:off x="8610480" y="6356520"/>
-            <a:ext cx="2742480" cy="364320"/>
+            <a:ext cx="2742120" cy="363960"/>
           </a:xfrm>
           <a:prstGeom prst="rect">
             <a:avLst/>
@@ -4705,7 +4888,7 @@
               </a:lnSpc>
               <a:buNone/>
             </a:pPr>
-            <a:fld id="{7C648285-9829-46B5-9C67-D9C7DF1B6D27}" type="slidenum">
+            <a:fld id="{323507E5-5B94-4C3D-AAD7-15858A72E99E}" type="slidenum">
               <a:rPr b="0" lang="en-IL" sz="1200" spc="-1" strike="noStrike">
                 <a:solidFill>
                   <a:srgbClr val="787878"/>
@@ -4722,7 +4905,7 @@
       </p:sp>
       <p:sp>
         <p:nvSpPr>
-          <p:cNvPr id="3" name="PlaceHolder 4"/>
+          <p:cNvPr id="4" name="PlaceHolder 5"/>
           <p:cNvSpPr>
             <a:spLocks noGrp="1"/>
           </p:cNvSpPr>
@@ -4733,7 +4916,7 @@
         <p:spPr>
           <a:xfrm>
             <a:off x="838080" y="6356520"/>
-            <a:ext cx="2742480" cy="364320"/>
+            <a:ext cx="2742120" cy="363960"/>
           </a:xfrm>
           <a:prstGeom prst="rect">
             <a:avLst/>
@@ -4763,189 +4946,6 @@
             </a:r>
             <a:endParaRPr b="0" lang="en-IL" sz="1400" spc="-1" strike="noStrike">
               <a:latin typeface="Times New Roman"/>
-            </a:endParaRPr>
-          </a:p>
-        </p:txBody>
-      </p:sp>
-      <p:sp>
-        <p:nvSpPr>
-          <p:cNvPr id="4" name="PlaceHolder 5"/>
-          <p:cNvSpPr>
-            <a:spLocks noGrp="1"/>
-          </p:cNvSpPr>
-          <p:nvPr>
-            <p:ph type="body"/>
-          </p:nvPr>
-        </p:nvSpPr>
-        <p:spPr>
-          <a:xfrm>
-            <a:off x="609480" y="1604520"/>
-            <a:ext cx="10972440" cy="3977280"/>
-          </a:xfrm>
-          <a:prstGeom prst="rect">
-            <a:avLst/>
-          </a:prstGeom>
-          <a:noFill/>
-          <a:ln w="0">
-            <a:noFill/>
-          </a:ln>
-        </p:spPr>
-        <p:txBody>
-          <a:bodyPr lIns="0" rIns="0" tIns="0" bIns="0" anchor="t">
-            <a:normAutofit/>
-          </a:bodyPr>
-          <a:p>
-            <a:pPr marL="432000" indent="-324000">
-              <a:spcBef>
-                <a:spcPts val="1417"/>
-              </a:spcBef>
-              <a:buClr>
-                <a:srgbClr val="000000"/>
-              </a:buClr>
-              <a:buSzPct val="45000"/>
-              <a:buFont typeface="Wingdings" charset="2"/>
-              <a:buChar char=""/>
-            </a:pPr>
-            <a:r>
-              <a:rPr b="0" lang="en-IL" sz="3200" spc="-1" strike="noStrike">
-                <a:latin typeface="Arial"/>
-              </a:rPr>
-              <a:t>Click to edit the outline text format</a:t>
-            </a:r>
-            <a:endParaRPr b="0" lang="en-IL" sz="3200" spc="-1" strike="noStrike">
-              <a:latin typeface="Arial"/>
-            </a:endParaRPr>
-          </a:p>
-          <a:p>
-            <a:pPr lvl="1" marL="864000" indent="-324000">
-              <a:spcBef>
-                <a:spcPts val="1134"/>
-              </a:spcBef>
-              <a:buClr>
-                <a:srgbClr val="000000"/>
-              </a:buClr>
-              <a:buSzPct val="75000"/>
-              <a:buFont typeface="Symbol" charset="2"/>
-              <a:buChar char=""/>
-            </a:pPr>
-            <a:r>
-              <a:rPr b="0" lang="en-IL" sz="2800" spc="-1" strike="noStrike">
-                <a:latin typeface="Arial"/>
-              </a:rPr>
-              <a:t>Second Outline Level</a:t>
-            </a:r>
-            <a:endParaRPr b="0" lang="en-IL" sz="2800" spc="-1" strike="noStrike">
-              <a:latin typeface="Arial"/>
-            </a:endParaRPr>
-          </a:p>
-          <a:p>
-            <a:pPr lvl="2" marL="1296000" indent="-288000">
-              <a:spcBef>
-                <a:spcPts val="850"/>
-              </a:spcBef>
-              <a:buClr>
-                <a:srgbClr val="000000"/>
-              </a:buClr>
-              <a:buSzPct val="45000"/>
-              <a:buFont typeface="Wingdings" charset="2"/>
-              <a:buChar char=""/>
-            </a:pPr>
-            <a:r>
-              <a:rPr b="0" lang="en-IL" sz="2400" spc="-1" strike="noStrike">
-                <a:latin typeface="Arial"/>
-              </a:rPr>
-              <a:t>Third Outline Level</a:t>
-            </a:r>
-            <a:endParaRPr b="0" lang="en-IL" sz="2400" spc="-1" strike="noStrike">
-              <a:latin typeface="Arial"/>
-            </a:endParaRPr>
-          </a:p>
-          <a:p>
-            <a:pPr lvl="3" marL="1728000" indent="-216000">
-              <a:spcBef>
-                <a:spcPts val="567"/>
-              </a:spcBef>
-              <a:buClr>
-                <a:srgbClr val="000000"/>
-              </a:buClr>
-              <a:buSzPct val="75000"/>
-              <a:buFont typeface="Symbol" charset="2"/>
-              <a:buChar char=""/>
-            </a:pPr>
-            <a:r>
-              <a:rPr b="0" lang="en-IL" sz="2000" spc="-1" strike="noStrike">
-                <a:latin typeface="Arial"/>
-              </a:rPr>
-              <a:t>Fourth Outline Level</a:t>
-            </a:r>
-            <a:endParaRPr b="0" lang="en-IL" sz="2000" spc="-1" strike="noStrike">
-              <a:latin typeface="Arial"/>
-            </a:endParaRPr>
-          </a:p>
-          <a:p>
-            <a:pPr lvl="4" marL="2160000" indent="-216000">
-              <a:spcBef>
-                <a:spcPts val="283"/>
-              </a:spcBef>
-              <a:buClr>
-                <a:srgbClr val="000000"/>
-              </a:buClr>
-              <a:buSzPct val="45000"/>
-              <a:buFont typeface="Wingdings" charset="2"/>
-              <a:buChar char=""/>
-            </a:pPr>
-            <a:r>
-              <a:rPr b="0" lang="en-IL" sz="2000" spc="-1" strike="noStrike">
-                <a:latin typeface="Arial"/>
-              </a:rPr>
-              <a:t>Fifth Outline Level</a:t>
-            </a:r>
-            <a:endParaRPr b="0" lang="en-IL" sz="2000" spc="-1" strike="noStrike">
-              <a:latin typeface="Arial"/>
-            </a:endParaRPr>
-          </a:p>
-          <a:p>
-            <a:pPr lvl="5" marL="2592000" indent="-216000">
-              <a:spcBef>
-                <a:spcPts val="283"/>
-              </a:spcBef>
-              <a:buClr>
-                <a:srgbClr val="000000"/>
-              </a:buClr>
-              <a:buSzPct val="45000"/>
-              <a:buFont typeface="Wingdings" charset="2"/>
-              <a:buChar char=""/>
-            </a:pPr>
-            <a:r>
-              <a:rPr b="0" lang="en-IL" sz="2000" spc="-1" strike="noStrike">
-                <a:latin typeface="Arial"/>
-              </a:rPr>
-              <a:t>Sixth Outline Level</a:t>
-            </a:r>
-            <a:endParaRPr b="0" lang="en-IL" sz="2000" spc="-1" strike="noStrike">
-              <a:latin typeface="Arial"/>
-            </a:endParaRPr>
-          </a:p>
-          <a:p>
-            <a:pPr lvl="6" marL="3024000" indent="-216000">
-              <a:spcBef>
-                <a:spcPts val="283"/>
-              </a:spcBef>
-              <a:buClr>
-                <a:srgbClr val="000000"/>
-              </a:buClr>
-              <a:buSzPct val="45000"/>
-              <a:buFont typeface="Wingdings" charset="2"/>
-              <a:buChar char=""/>
-            </a:pPr>
-            <a:r>
-              <a:rPr b="0" lang="en-IL" sz="2000" spc="-1" strike="noStrike">
-                <a:latin typeface="Arial"/>
-              </a:rPr>
-              <a:t>Seventh Outline Level</a:t>
-            </a:r>
-            <a:endParaRPr b="0" lang="en-IL" sz="2000" spc="-1" strike="noStrike">
-              <a:latin typeface="Arial"/>
             </a:endParaRPr>
           </a:p>
         </p:txBody>
@@ -5007,7 +5007,7 @@
         <p:spPr>
           <a:xfrm>
             <a:off x="4038480" y="6356520"/>
-            <a:ext cx="4114080" cy="364320"/>
+            <a:ext cx="4113720" cy="363960"/>
           </a:xfrm>
           <a:prstGeom prst="rect">
             <a:avLst/>
@@ -5064,7 +5064,7 @@
         <p:spPr>
           <a:xfrm>
             <a:off x="8610480" y="6356520"/>
-            <a:ext cx="2742480" cy="364320"/>
+            <a:ext cx="2742120" cy="363960"/>
           </a:xfrm>
           <a:prstGeom prst="rect">
             <a:avLst/>
@@ -5099,7 +5099,7 @@
               </a:lnSpc>
               <a:buNone/>
             </a:pPr>
-            <a:fld id="{849C4CCC-23B9-4453-AD4B-EA0493F40C6A}" type="slidenum">
+            <a:fld id="{45CD8E60-DC53-44C0-8FDA-1BAA066B766D}" type="slidenum">
               <a:rPr b="0" lang="en-IL" sz="1200" spc="-1" strike="noStrike">
                 <a:solidFill>
                   <a:srgbClr val="787878"/>
@@ -5127,7 +5127,7 @@
         <p:spPr>
           <a:xfrm>
             <a:off x="838080" y="6356520"/>
-            <a:ext cx="2742480" cy="364320"/>
+            <a:ext cx="2742120" cy="363960"/>
           </a:xfrm>
           <a:prstGeom prst="rect">
             <a:avLst/>
@@ -5435,7 +5435,7 @@
         <p:spPr>
           <a:xfrm>
             <a:off x="648360" y="1838520"/>
-            <a:ext cx="2202840" cy="913680"/>
+            <a:ext cx="2202480" cy="913320"/>
           </a:xfrm>
           <a:prstGeom prst="rect">
             <a:avLst/>
@@ -5501,7 +5501,7 @@
         <p:spPr>
           <a:xfrm>
             <a:off x="100080" y="133200"/>
-            <a:ext cx="2202840" cy="913680"/>
+            <a:ext cx="2202480" cy="913320"/>
           </a:xfrm>
           <a:prstGeom prst="rect">
             <a:avLst/>
@@ -5567,7 +5567,7 @@
         <p:spPr>
           <a:xfrm>
             <a:off x="3079800" y="193680"/>
-            <a:ext cx="2202840" cy="913680"/>
+            <a:ext cx="2202480" cy="913320"/>
           </a:xfrm>
           <a:prstGeom prst="rect">
             <a:avLst/>
@@ -5633,7 +5633,7 @@
         <p:spPr>
           <a:xfrm>
             <a:off x="8998200" y="2618280"/>
-            <a:ext cx="2202840" cy="913680"/>
+            <a:ext cx="2202480" cy="913320"/>
           </a:xfrm>
           <a:prstGeom prst="rect">
             <a:avLst/>
@@ -5699,7 +5699,7 @@
         <p:spPr>
           <a:xfrm>
             <a:off x="7006680" y="946080"/>
-            <a:ext cx="2202840" cy="913680"/>
+            <a:ext cx="2202480" cy="913320"/>
           </a:xfrm>
           <a:prstGeom prst="rect">
             <a:avLst/>
@@ -5765,7 +5765,7 @@
         <p:spPr>
           <a:xfrm>
             <a:off x="5733000" y="4156560"/>
-            <a:ext cx="2202840" cy="913680"/>
+            <a:ext cx="2202480" cy="913320"/>
           </a:xfrm>
           <a:prstGeom prst="rect">
             <a:avLst/>
@@ -5831,7 +5831,7 @@
         <p:spPr>
           <a:xfrm>
             <a:off x="3741480" y="1481400"/>
-            <a:ext cx="2202840" cy="913680"/>
+            <a:ext cx="2202480" cy="913320"/>
           </a:xfrm>
           <a:prstGeom prst="rect">
             <a:avLst/>
@@ -5895,7 +5895,7 @@
         <p:spPr>
           <a:xfrm>
             <a:off x="-2608920" y="2838600"/>
-            <a:ext cx="2202840" cy="913680"/>
+            <a:ext cx="2202480" cy="913320"/>
           </a:xfrm>
           <a:prstGeom prst="rect">
             <a:avLst/>
@@ -5959,7 +5959,7 @@
         <p:spPr>
           <a:xfrm>
             <a:off x="1201680" y="1041480"/>
-            <a:ext cx="360" cy="818280"/>
+            <a:ext cx="360" cy="817920"/>
           </a:xfrm>
           <a:custGeom>
             <a:avLst/>
@@ -6014,8 +6014,8 @@
         </p:nvSpPr>
         <p:spPr>
           <a:xfrm flipH="1">
-            <a:off x="2739600" y="1123920"/>
-            <a:ext cx="446400" cy="713520"/>
+            <a:off x="2738880" y="1123920"/>
+            <a:ext cx="446040" cy="713160"/>
           </a:xfrm>
           <a:custGeom>
             <a:avLst/>
@@ -6071,7 +6071,7 @@
         <p:spPr>
           <a:xfrm>
             <a:off x="2877480" y="1028880"/>
-            <a:ext cx="201600" cy="302760"/>
+            <a:ext cx="201240" cy="302760"/>
           </a:xfrm>
           <a:prstGeom prst="rect">
             <a:avLst/>
@@ -6123,7 +6123,7 @@
         <p:spPr>
           <a:xfrm>
             <a:off x="2538000" y="1516320"/>
-            <a:ext cx="201600" cy="302760"/>
+            <a:ext cx="201240" cy="302760"/>
           </a:xfrm>
           <a:prstGeom prst="rect">
             <a:avLst/>
@@ -6175,7 +6175,7 @@
         <p:spPr>
           <a:xfrm>
             <a:off x="956160" y="1581120"/>
-            <a:ext cx="201600" cy="302760"/>
+            <a:ext cx="201240" cy="302760"/>
           </a:xfrm>
           <a:prstGeom prst="rect">
             <a:avLst/>
@@ -6227,7 +6227,7 @@
         <p:spPr>
           <a:xfrm>
             <a:off x="960120" y="1028880"/>
-            <a:ext cx="201600" cy="302760"/>
+            <a:ext cx="201240" cy="302760"/>
           </a:xfrm>
           <a:prstGeom prst="rect">
             <a:avLst/>
@@ -6279,7 +6279,7 @@
         <p:spPr>
           <a:xfrm>
             <a:off x="-1352160" y="1522440"/>
-            <a:ext cx="201600" cy="302760"/>
+            <a:ext cx="201240" cy="302760"/>
           </a:xfrm>
           <a:prstGeom prst="rect">
             <a:avLst/>
@@ -6331,7 +6331,7 @@
         <p:spPr>
           <a:xfrm>
             <a:off x="-1800360" y="1531800"/>
-            <a:ext cx="201600" cy="302760"/>
+            <a:ext cx="201240" cy="302760"/>
           </a:xfrm>
           <a:prstGeom prst="rect">
             <a:avLst/>
@@ -6383,7 +6383,7 @@
         <p:spPr>
           <a:xfrm>
             <a:off x="-1507320" y="1878120"/>
-            <a:ext cx="201600" cy="302760"/>
+            <a:ext cx="201240" cy="302760"/>
           </a:xfrm>
           <a:prstGeom prst="rect">
             <a:avLst/>
@@ -6434,8 +6434,8 @@
         </p:nvSpPr>
         <p:spPr>
           <a:xfrm flipH="1">
-            <a:off x="2860200" y="2325960"/>
-            <a:ext cx="879840" cy="360"/>
+            <a:off x="2859480" y="2325960"/>
+            <a:ext cx="879480" cy="360"/>
           </a:xfrm>
           <a:custGeom>
             <a:avLst/>
@@ -6491,7 +6491,7 @@
         <p:spPr>
           <a:xfrm>
             <a:off x="3484080" y="2032200"/>
-            <a:ext cx="201600" cy="302760"/>
+            <a:ext cx="201240" cy="302760"/>
           </a:xfrm>
           <a:prstGeom prst="rect">
             <a:avLst/>
@@ -6543,7 +6543,7 @@
         <p:spPr>
           <a:xfrm>
             <a:off x="2851920" y="2032200"/>
-            <a:ext cx="201600" cy="302760"/>
+            <a:ext cx="201240" cy="302760"/>
           </a:xfrm>
           <a:prstGeom prst="rect">
             <a:avLst/>
@@ -6594,8 +6594,8 @@
         </p:nvSpPr>
         <p:spPr>
           <a:xfrm flipH="1">
-            <a:off x="5944320" y="1670400"/>
-            <a:ext cx="1061280" cy="360"/>
+            <a:off x="5943600" y="1670400"/>
+            <a:ext cx="1060920" cy="360"/>
           </a:xfrm>
           <a:custGeom>
             <a:avLst/>
@@ -6651,7 +6651,7 @@
         <p:spPr>
           <a:xfrm>
             <a:off x="6696000" y="1344240"/>
-            <a:ext cx="201600" cy="302760"/>
+            <a:ext cx="201240" cy="302760"/>
           </a:xfrm>
           <a:prstGeom prst="rect">
             <a:avLst/>
@@ -6703,7 +6703,7 @@
         <p:spPr>
           <a:xfrm>
             <a:off x="5942520" y="1326240"/>
-            <a:ext cx="201600" cy="302760"/>
+            <a:ext cx="201240" cy="302760"/>
           </a:xfrm>
           <a:prstGeom prst="rect">
             <a:avLst/>
@@ -6754,8 +6754,8 @@
         </p:nvSpPr>
         <p:spPr>
           <a:xfrm flipH="1">
-            <a:off x="-1847160" y="2340000"/>
-            <a:ext cx="879840" cy="360"/>
+            <a:off x="-1847880" y="2340000"/>
+            <a:ext cx="879480" cy="360"/>
           </a:xfrm>
           <a:custGeom>
             <a:avLst/>
@@ -6813,7 +6813,7 @@
         <p:spPr>
           <a:xfrm>
             <a:off x="8998200" y="4154400"/>
-            <a:ext cx="2202840" cy="913680"/>
+            <a:ext cx="2202480" cy="913320"/>
           </a:xfrm>
           <a:prstGeom prst="rect">
             <a:avLst/>
@@ -6877,7 +6877,7 @@
         <p:spPr>
           <a:xfrm flipV="1">
             <a:off x="7723080" y="1877760"/>
-            <a:ext cx="360" cy="754920"/>
+            <a:ext cx="360" cy="754560"/>
           </a:xfrm>
           <a:custGeom>
             <a:avLst/>
@@ -6935,7 +6935,7 @@
         <p:spPr>
           <a:xfrm>
             <a:off x="5733000" y="2634120"/>
-            <a:ext cx="2202840" cy="913680"/>
+            <a:ext cx="2202480" cy="913320"/>
           </a:xfrm>
           <a:prstGeom prst="rect">
             <a:avLst/>
@@ -6999,7 +6999,7 @@
         <p:spPr>
           <a:xfrm>
             <a:off x="7430400" y="2340000"/>
-            <a:ext cx="201600" cy="302760"/>
+            <a:ext cx="201240" cy="302760"/>
           </a:xfrm>
           <a:prstGeom prst="rect">
             <a:avLst/>
@@ -7051,7 +7051,7 @@
         <p:spPr>
           <a:xfrm>
             <a:off x="7484040" y="1791000"/>
-            <a:ext cx="201600" cy="302760"/>
+            <a:ext cx="201240" cy="302760"/>
           </a:xfrm>
           <a:prstGeom prst="rect">
             <a:avLst/>
@@ -7103,7 +7103,7 @@
         <p:spPr>
           <a:xfrm flipV="1">
             <a:off x="10605960" y="3541320"/>
-            <a:ext cx="360" cy="613800"/>
+            <a:ext cx="360" cy="613440"/>
           </a:xfrm>
           <a:custGeom>
             <a:avLst/>
@@ -7159,7 +7159,7 @@
         <p:spPr>
           <a:xfrm>
             <a:off x="10350000" y="3532680"/>
-            <a:ext cx="201600" cy="302760"/>
+            <a:ext cx="201240" cy="302760"/>
           </a:xfrm>
           <a:prstGeom prst="rect">
             <a:avLst/>
@@ -7211,7 +7211,7 @@
         <p:spPr>
           <a:xfrm>
             <a:off x="10320480" y="3858120"/>
-            <a:ext cx="201600" cy="302760"/>
+            <a:ext cx="201240" cy="302760"/>
           </a:xfrm>
           <a:prstGeom prst="rect">
             <a:avLst/>
@@ -7263,7 +7263,7 @@
         <p:spPr>
           <a:xfrm flipV="1">
             <a:off x="6759720" y="3555720"/>
-            <a:ext cx="360" cy="613800"/>
+            <a:ext cx="360" cy="613440"/>
           </a:xfrm>
           <a:custGeom>
             <a:avLst/>
@@ -7319,7 +7319,7 @@
         <p:spPr>
           <a:xfrm>
             <a:off x="6504120" y="3547080"/>
-            <a:ext cx="201600" cy="302760"/>
+            <a:ext cx="201240" cy="302760"/>
           </a:xfrm>
           <a:prstGeom prst="rect">
             <a:avLst/>
@@ -7371,7 +7371,7 @@
         <p:spPr>
           <a:xfrm>
             <a:off x="6474600" y="3872520"/>
-            <a:ext cx="201600" cy="302760"/>
+            <a:ext cx="201240" cy="302760"/>
           </a:xfrm>
           <a:prstGeom prst="rect">
             <a:avLst/>
@@ -7422,8 +7422,8 @@
         </p:nvSpPr>
         <p:spPr>
           <a:xfrm flipH="1">
-            <a:off x="7938000" y="4647960"/>
-            <a:ext cx="1061280" cy="360"/>
+            <a:off x="7937280" y="4647960"/>
+            <a:ext cx="1060920" cy="360"/>
           </a:xfrm>
           <a:custGeom>
             <a:avLst/>
@@ -7479,7 +7479,7 @@
         <p:spPr>
           <a:xfrm>
             <a:off x="8689680" y="4321800"/>
-            <a:ext cx="201600" cy="302760"/>
+            <a:ext cx="201240" cy="302760"/>
           </a:xfrm>
           <a:prstGeom prst="rect">
             <a:avLst/>
@@ -7531,7 +7531,7 @@
         <p:spPr>
           <a:xfrm>
             <a:off x="7936200" y="4303800"/>
-            <a:ext cx="201600" cy="302760"/>
+            <a:ext cx="201240" cy="302760"/>
           </a:xfrm>
           <a:prstGeom prst="rect">
             <a:avLst/>
@@ -7583,7 +7583,7 @@
         <p:spPr>
           <a:xfrm>
             <a:off x="360000" y="5206320"/>
-            <a:ext cx="2202840" cy="913680"/>
+            <a:ext cx="2202480" cy="913320"/>
           </a:xfrm>
           <a:prstGeom prst="rect">
             <a:avLst/>
@@ -7670,7 +7670,7 @@
         <p:spPr>
           <a:xfrm>
             <a:off x="2700000" y="3586320"/>
-            <a:ext cx="2700000" cy="913680"/>
+            <a:ext cx="2699640" cy="913320"/>
           </a:xfrm>
           <a:prstGeom prst="rect">
             <a:avLst/>
@@ -7734,7 +7734,7 @@
         <p:spPr>
           <a:xfrm>
             <a:off x="2700000" y="2752200"/>
-            <a:ext cx="720000" cy="834120"/>
+            <a:ext cx="719640" cy="833760"/>
           </a:xfrm>
           <a:custGeom>
             <a:avLst/>
@@ -7790,7 +7790,7 @@
         <p:spPr>
           <a:xfrm>
             <a:off x="2851200" y="2700000"/>
-            <a:ext cx="201600" cy="302760"/>
+            <a:ext cx="201240" cy="302760"/>
           </a:xfrm>
           <a:prstGeom prst="rect">
             <a:avLst/>
@@ -7842,7 +7842,7 @@
         <p:spPr>
           <a:xfrm>
             <a:off x="3326400" y="3276000"/>
-            <a:ext cx="201600" cy="302760"/>
+            <a:ext cx="201240" cy="302760"/>
           </a:xfrm>
           <a:prstGeom prst="rect">
             <a:avLst/>
@@ -7928,7 +7928,7 @@
         <p:spPr>
           <a:xfrm>
             <a:off x="838080" y="365040"/>
-            <a:ext cx="10514880" cy="1324800"/>
+            <a:ext cx="10514520" cy="1324440"/>
           </a:xfrm>
           <a:prstGeom prst="rect">
             <a:avLst/>
@@ -8571,6 +8571,12 @@
                       <a:noAutofit/>
                     </a:bodyPr>
                     <a:p>
+                      <a:pPr>
+                        <a:lnSpc>
+                          <a:spcPct val="100000"/>
+                        </a:lnSpc>
+                        <a:buNone/>
+                      </a:pPr>
                       <a:r>
                         <a:rPr b="0" lang="en-IL" sz="1800" spc="-1" strike="noStrike">
                           <a:latin typeface="Arial"/>
@@ -8792,7 +8798,7 @@
         <p:spPr>
           <a:xfrm>
             <a:off x="838080" y="365040"/>
-            <a:ext cx="10514880" cy="1324800"/>
+            <a:ext cx="10514520" cy="1324440"/>
           </a:xfrm>
           <a:prstGeom prst="rect">
             <a:avLst/>
@@ -8836,7 +8842,7 @@
         </p:nvGraphicFramePr>
         <p:xfrm>
           <a:off x="838080" y="1825560"/>
-          <a:ext cx="10514880" cy="1981800"/>
+          <a:ext cx="10514880" cy="1853640"/>
         </p:xfrm>
         <a:graphic>
           <a:graphicData uri="http://schemas.openxmlformats.org/drawingml/2006/table">
@@ -9367,7 +9373,7 @@
                         <a:srgbClr val="ffffff"/>
                       </a:solidFill>
                     </a:lnT>
-                    <a:lnB>
+                    <a:lnB w="12240">
                       <a:noFill/>
                     </a:lnB>
                     <a:solidFill>
@@ -9417,7 +9423,7 @@
                         <a:srgbClr val="ffffff"/>
                       </a:solidFill>
                     </a:lnT>
-                    <a:lnB>
+                    <a:lnB w="12240">
                       <a:noFill/>
                     </a:lnB>
                     <a:solidFill>
@@ -9470,7 +9476,7 @@
                         <a:srgbClr val="ffffff"/>
                       </a:solidFill>
                     </a:lnT>
-                    <a:lnB>
+                    <a:lnB w="12240">
                       <a:noFill/>
                     </a:lnB>
                     <a:solidFill>
@@ -9486,6 +9492,12 @@
                       <a:noAutofit/>
                     </a:bodyPr>
                     <a:p>
+                      <a:pPr>
+                        <a:lnSpc>
+                          <a:spcPct val="100000"/>
+                        </a:lnSpc>
+                        <a:buNone/>
+                      </a:pPr>
                       <a:r>
                         <a:rPr b="0" lang="en-US" sz="1800" spc="-1" strike="noStrike">
                           <a:solidFill>
@@ -9548,7 +9560,7 @@
                         <a:t>int(16)</a:t>
                       </a:r>
                       <a:endParaRPr b="0" lang="en-IL" sz="1800" spc="-1" strike="noStrike">
-                        <a:latin typeface="Times New Roman"/>
+                        <a:latin typeface="Arial"/>
                       </a:endParaRPr>
                     </a:p>
                   </a:txBody>
@@ -9600,10 +9612,10 @@
                           </a:solidFill>
                           <a:latin typeface="Aptos"/>
                         </a:rPr>
-                        <a:t>Not Null</a:t>
-                      </a:r>
-                      <a:endParaRPr b="0" lang="en-IL" sz="1800" spc="-1" strike="noStrike">
-                        <a:latin typeface="Times New Roman"/>
+                        <a:t>Not Null, in mg/ml</a:t>
+                      </a:r>
+                      <a:endParaRPr b="0" lang="en-IL" sz="1800" spc="-1" strike="noStrike">
+                        <a:latin typeface="Arial"/>
                       </a:endParaRPr>
                     </a:p>
                   </a:txBody>
@@ -9681,7 +9693,7 @@
         <p:spPr>
           <a:xfrm>
             <a:off x="838080" y="365040"/>
-            <a:ext cx="10514880" cy="1324800"/>
+            <a:ext cx="10514520" cy="1324440"/>
           </a:xfrm>
           <a:prstGeom prst="rect">
             <a:avLst/>
@@ -9725,7 +9737,7 @@
         </p:nvGraphicFramePr>
         <p:xfrm>
           <a:off x="838080" y="1825560"/>
-          <a:ext cx="10514880" cy="4430880"/>
+          <a:ext cx="10514880" cy="2416680"/>
         </p:xfrm>
         <a:graphic>
           <a:graphicData uri="http://schemas.openxmlformats.org/drawingml/2006/table">
@@ -10706,7 +10718,7 @@
         <p:spPr>
           <a:xfrm>
             <a:off x="838080" y="365040"/>
-            <a:ext cx="10514880" cy="1324800"/>
+            <a:ext cx="10514520" cy="1324440"/>
           </a:xfrm>
           <a:prstGeom prst="rect">
             <a:avLst/>
@@ -11604,7 +11616,7 @@
         <p:spPr>
           <a:xfrm>
             <a:off x="838080" y="365040"/>
-            <a:ext cx="10514880" cy="1324800"/>
+            <a:ext cx="10514520" cy="1324440"/>
           </a:xfrm>
           <a:prstGeom prst="rect">
             <a:avLst/>
@@ -11995,7 +12007,7 @@
                           </a:solidFill>
                           <a:latin typeface="Aptos"/>
                         </a:rPr>
-                        <a:t>Username</a:t>
+                        <a:t>PhoneNumber</a:t>
                       </a:r>
                       <a:endParaRPr b="0" lang="en-IL" sz="1800" spc="-1" strike="noStrike">
                         <a:latin typeface="Arial"/>
@@ -12047,7 +12059,7 @@
                           </a:solidFill>
                           <a:latin typeface="Aptos"/>
                         </a:rPr>
-                        <a:t>varchar(50)</a:t>
+                        <a:t>varchar(15)</a:t>
                       </a:r>
                       <a:endParaRPr b="0" lang="en-IL" sz="1800" spc="-1" strike="noStrike">
                         <a:latin typeface="Arial"/>
@@ -12153,7 +12165,7 @@
                           </a:solidFill>
                           <a:latin typeface="Aptos"/>
                         </a:rPr>
-                        <a:t>Password</a:t>
+                        <a:t>cardID</a:t>
                       </a:r>
                       <a:endParaRPr b="0" lang="en-IL" sz="1800" spc="-1" strike="noStrike">
                         <a:latin typeface="Arial"/>
@@ -12208,7 +12220,7 @@
                           </a:solidFill>
                           <a:latin typeface="Aptos"/>
                         </a:rPr>
-                        <a:t>varchar(250)</a:t>
+                        <a:t>varchar(15)</a:t>
                       </a:r>
                       <a:endParaRPr b="0" lang="en-IL" sz="1800" spc="-1" strike="noStrike">
                         <a:latin typeface="Arial"/>
@@ -12260,7 +12272,7 @@
                           </a:solidFill>
                           <a:latin typeface="Aptos"/>
                         </a:rPr>
-                        <a:t>Not Null, MD5 hash</a:t>
+                        <a:t>Not Null</a:t>
                       </a:r>
                       <a:endParaRPr b="0" lang="en-IL" sz="1800" spc="-1" strike="noStrike">
                         <a:latin typeface="Arial"/>
@@ -12341,7 +12353,7 @@
         <p:spPr>
           <a:xfrm>
             <a:off x="838080" y="365040"/>
-            <a:ext cx="10514880" cy="1324800"/>
+            <a:ext cx="10514520" cy="1324440"/>
           </a:xfrm>
           <a:prstGeom prst="rect">
             <a:avLst/>
@@ -13712,12 +13724,8 @@
                         </a:rPr>
                         <a:t>Lookup1001</a:t>
                       </a:r>
-                      <a:endParaRPr b="0" lang="en-US" sz="1800" spc="-1" strike="noStrike">
-                        <a:solidFill>
-                          <a:srgbClr val="000000"/>
-                        </a:solidFill>
-                        <a:latin typeface="Aptos"/>
-                        <a:ea typeface="Noto Sans CJK SC"/>
+                      <a:endParaRPr b="0" lang="en-IL" sz="1800" spc="-1" strike="noStrike">
+                        <a:latin typeface="Arial"/>
                       </a:endParaRPr>
                     </a:p>
                   </a:txBody>
@@ -14061,6 +14069,133 @@
                     </a:lnB>
                     <a:solidFill>
                       <a:srgbClr val="e7eaec"/>
+                    </a:solidFill>
+                  </a:tcPr>
+                </a:tc>
+              </a:tr>
+              <a:tr h="402840">
+                <a:tc>
+                  <a:txBody>
+                    <a:bodyPr anchor="t">
+                      <a:noAutofit/>
+                    </a:bodyPr>
+                    <a:p>
+                      <a:pPr>
+                        <a:lnSpc>
+                          <a:spcPct val="100000"/>
+                        </a:lnSpc>
+                        <a:buNone/>
+                      </a:pPr>
+                      <a:r>
+                        <a:rPr b="0" lang="en-US" sz="1800" spc="-1" strike="noStrike">
+                          <a:solidFill>
+                            <a:srgbClr val="000000"/>
+                          </a:solidFill>
+                          <a:latin typeface="Aptos"/>
+                        </a:rPr>
+                        <a:t>Email</a:t>
+                      </a:r>
+                      <a:endParaRPr b="0" lang="en-IL" sz="1800" spc="-1" strike="noStrike">
+                        <a:latin typeface="Times New Roman"/>
+                      </a:endParaRPr>
+                    </a:p>
+                  </a:txBody>
+                  <a:tcPr anchor="t" marL="91440" marR="91440">
+                    <a:lnL w="12240">
+                      <a:solidFill>
+                        <a:srgbClr val="ffffff"/>
+                      </a:solidFill>
+                    </a:lnL>
+                    <a:lnR w="12240">
+                      <a:solidFill>
+                        <a:srgbClr val="ffffff"/>
+                      </a:solidFill>
+                    </a:lnR>
+                    <a:lnT w="12240">
+                      <a:solidFill>
+                        <a:srgbClr val="ffffff"/>
+                      </a:solidFill>
+                    </a:lnT>
+                    <a:lnB w="12240">
+                      <a:solidFill>
+                        <a:srgbClr val="ffffff"/>
+                      </a:solidFill>
+                    </a:lnB>
+                    <a:solidFill>
+                      <a:srgbClr val="ccd2d8"/>
+                    </a:solidFill>
+                  </a:tcPr>
+                </a:tc>
+                <a:tc>
+                  <a:txBody>
+                    <a:bodyPr anchor="t">
+                      <a:noAutofit/>
+                    </a:bodyPr>
+                    <a:p>
+                      <a:r>
+                        <a:rPr b="0" lang="en-US" sz="1800" spc="-1" strike="noStrike">
+                          <a:solidFill>
+                            <a:srgbClr val="000000"/>
+                          </a:solidFill>
+                          <a:latin typeface="Aptos"/>
+                        </a:rPr>
+                        <a:t>varchar(124)</a:t>
+                      </a:r>
+                      <a:endParaRPr b="0" lang="en-IL" sz="1800" spc="-1" strike="noStrike">
+                        <a:latin typeface="Times New Roman"/>
+                      </a:endParaRPr>
+                    </a:p>
+                  </a:txBody>
+                  <a:tcPr anchor="t" marL="91440" marR="91440">
+                    <a:lnL w="12240">
+                      <a:solidFill>
+                        <a:srgbClr val="ffffff"/>
+                      </a:solidFill>
+                    </a:lnL>
+                    <a:lnR w="12240">
+                      <a:solidFill>
+                        <a:srgbClr val="ffffff"/>
+                      </a:solidFill>
+                    </a:lnR>
+                    <a:lnT w="12240">
+                      <a:solidFill>
+                        <a:srgbClr val="ffffff"/>
+                      </a:solidFill>
+                    </a:lnT>
+                    <a:lnB w="12240">
+                      <a:solidFill>
+                        <a:srgbClr val="ffffff"/>
+                      </a:solidFill>
+                    </a:lnB>
+                    <a:solidFill>
+                      <a:srgbClr val="ccd2d8"/>
+                    </a:solidFill>
+                  </a:tcPr>
+                </a:tc>
+                <a:tc>
+                  <a:tcPr anchor="t" marL="91440" marR="91440">
+                    <a:lnL w="12240">
+                      <a:solidFill>
+                        <a:srgbClr val="ffffff"/>
+                      </a:solidFill>
+                    </a:lnL>
+                    <a:lnR w="12240">
+                      <a:solidFill>
+                        <a:srgbClr val="ffffff"/>
+                      </a:solidFill>
+                    </a:lnR>
+                    <a:lnT w="12240">
+                      <a:solidFill>
+                        <a:srgbClr val="ffffff"/>
+                      </a:solidFill>
+                    </a:lnT>
+                    <a:lnB w="12240">
+                      <a:solidFill>
+                        <a:srgbClr val="ffffff"/>
+                      </a:solidFill>
+                    </a:lnB>
+                    <a:solidFill>
+                      <a:srgbClr val="ccd2d8"/>
                     </a:solidFill>
                   </a:tcPr>
                 </a:tc>
@@ -14112,7 +14247,7 @@
         <p:spPr>
           <a:xfrm>
             <a:off x="838080" y="0"/>
-            <a:ext cx="10514880" cy="624600"/>
+            <a:ext cx="10514520" cy="624240"/>
           </a:xfrm>
           <a:prstGeom prst="rect">
             <a:avLst/>
@@ -15974,16 +16109,7 @@
                           <a:latin typeface="Aptos"/>
                           <a:ea typeface="Noto Sans CJK SC"/>
                         </a:rPr>
-                        <a:t>f</a:t>
-                      </a:r>
-                      <a:r>
-                        <a:rPr b="0" lang="en-US" sz="1800" spc="-1" strike="noStrike">
-                          <a:solidFill>
-                            <a:srgbClr val="000000"/>
-                          </a:solidFill>
-                          <a:latin typeface="Aptos"/>
-                        </a:rPr>
-                        <a:t>loat(5, 2)</a:t>
+                        <a:t>float(5, 2)</a:t>
                       </a:r>
                       <a:endParaRPr b="0" lang="en-IL" sz="1800" spc="-1" strike="noStrike">
                         <a:latin typeface="Arial"/>
@@ -16389,16 +16515,7 @@
                           <a:latin typeface="Aptos"/>
                           <a:ea typeface="Noto Sans CJK SC"/>
                         </a:rPr>
-                        <a:t>f</a:t>
-                      </a:r>
-                      <a:r>
-                        <a:rPr b="0" lang="en-US" sz="1800" spc="-1" strike="noStrike">
-                          <a:solidFill>
-                            <a:srgbClr val="000000"/>
-                          </a:solidFill>
-                          <a:latin typeface="Aptos"/>
-                        </a:rPr>
-                        <a:t>loat(5, 2)</a:t>
+                        <a:t>float(5, 2)</a:t>
                       </a:r>
                       <a:endParaRPr b="0" lang="en-IL" sz="1800" spc="-1" strike="noStrike">
                         <a:latin typeface="Arial"/>
@@ -16535,16 +16652,7 @@
                           <a:latin typeface="Aptos"/>
                           <a:ea typeface="Noto Sans CJK SC"/>
                         </a:rPr>
-                        <a:t>f</a:t>
-                      </a:r>
-                      <a:r>
-                        <a:rPr b="0" lang="en-US" sz="1800" spc="-1" strike="noStrike">
-                          <a:solidFill>
-                            <a:srgbClr val="000000"/>
-                          </a:solidFill>
-                          <a:latin typeface="Aptos"/>
-                        </a:rPr>
-                        <a:t>loat(5, 2)</a:t>
+                        <a:t>float(5, 2)</a:t>
                       </a:r>
                       <a:endParaRPr b="0" lang="en-IL" sz="1800" spc="-1" strike="noStrike">
                         <a:latin typeface="Arial"/>
@@ -16684,16 +16792,7 @@
                           <a:latin typeface="Aptos"/>
                           <a:ea typeface="Noto Sans CJK SC"/>
                         </a:rPr>
-                        <a:t>f</a:t>
-                      </a:r>
-                      <a:r>
-                        <a:rPr b="0" lang="en-US" sz="1800" spc="-1" strike="noStrike">
-                          <a:solidFill>
-                            <a:srgbClr val="000000"/>
-                          </a:solidFill>
-                          <a:latin typeface="Aptos"/>
-                        </a:rPr>
-                        <a:t>loat(5, 2)</a:t>
+                        <a:t>float(5, 2)</a:t>
                       </a:r>
                       <a:endParaRPr b="0" lang="en-IL" sz="1800" spc="-1" strike="noStrike">
                         <a:latin typeface="Arial"/>
@@ -16801,7 +16900,7 @@
         <p:spPr>
           <a:xfrm>
             <a:off x="838080" y="365040"/>
-            <a:ext cx="10514880" cy="1324800"/>
+            <a:ext cx="10514520" cy="1324440"/>
           </a:xfrm>
           <a:prstGeom prst="rect">
             <a:avLst/>
@@ -17643,7 +17742,7 @@
         <p:spPr>
           <a:xfrm>
             <a:off x="838080" y="365040"/>
-            <a:ext cx="10514880" cy="1324800"/>
+            <a:ext cx="10514520" cy="1324440"/>
           </a:xfrm>
           <a:prstGeom prst="rect">
             <a:avLst/>
@@ -18841,7 +18940,7 @@
         <p:spPr>
           <a:xfrm>
             <a:off x="838080" y="365040"/>
-            <a:ext cx="10514880" cy="1324800"/>
+            <a:ext cx="10514520" cy="1324440"/>
           </a:xfrm>
           <a:prstGeom prst="rect">
             <a:avLst/>
@@ -20792,7 +20891,7 @@
         <p:spPr>
           <a:xfrm>
             <a:off x="838080" y="365040"/>
-            <a:ext cx="10514880" cy="1324800"/>
+            <a:ext cx="10514520" cy="1324440"/>
           </a:xfrm>
           <a:prstGeom prst="rect">
             <a:avLst/>

</xml_diff>